<commit_message>
Documentation and Power Point changed
</commit_message>
<xml_diff>
--- a/OMCS.pptx
+++ b/OMCS.pptx
@@ -5,7 +5,7 @@
     <p:sldMasterId id="2147483677" r:id="rId1"/>
   </p:sldMasterIdLst>
   <p:notesMasterIdLst>
-    <p:notesMasterId r:id="rId12"/>
+    <p:notesMasterId r:id="rId13"/>
   </p:notesMasterIdLst>
   <p:sldIdLst>
     <p:sldId id="336" r:id="rId2"/>
@@ -15,33 +15,34 @@
     <p:sldId id="263" r:id="rId6"/>
     <p:sldId id="279" r:id="rId7"/>
     <p:sldId id="291" r:id="rId8"/>
-    <p:sldId id="299" r:id="rId9"/>
-    <p:sldId id="286" r:id="rId10"/>
-    <p:sldId id="309" r:id="rId11"/>
+    <p:sldId id="337" r:id="rId9"/>
+    <p:sldId id="299" r:id="rId10"/>
+    <p:sldId id="286" r:id="rId11"/>
+    <p:sldId id="309" r:id="rId12"/>
   </p:sldIdLst>
   <p:sldSz cx="9144000" cy="5143500" type="screen16x9"/>
   <p:notesSz cx="6858000" cy="9144000"/>
   <p:embeddedFontLst>
     <p:embeddedFont>
       <p:font typeface="Exo 2" panose="020B0604020202020204" charset="-52"/>
-      <p:regular r:id="rId13"/>
-      <p:bold r:id="rId14"/>
-      <p:italic r:id="rId15"/>
-      <p:boldItalic r:id="rId16"/>
+      <p:regular r:id="rId14"/>
+      <p:bold r:id="rId15"/>
+      <p:italic r:id="rId16"/>
+      <p:boldItalic r:id="rId17"/>
     </p:embeddedFont>
     <p:embeddedFont>
       <p:font typeface="Fira Sans Extra Condensed Medium" panose="020B0604020202020204" charset="0"/>
-      <p:regular r:id="rId17"/>
-      <p:bold r:id="rId18"/>
-      <p:italic r:id="rId19"/>
-      <p:boldItalic r:id="rId20"/>
+      <p:regular r:id="rId18"/>
+      <p:bold r:id="rId19"/>
+      <p:italic r:id="rId20"/>
+      <p:boldItalic r:id="rId21"/>
     </p:embeddedFont>
     <p:embeddedFont>
       <p:font typeface="Roboto Condensed Light" panose="02000000000000000000" pitchFamily="2" charset="0"/>
-      <p:regular r:id="rId21"/>
-      <p:bold r:id="rId22"/>
-      <p:italic r:id="rId23"/>
-      <p:boldItalic r:id="rId24"/>
+      <p:regular r:id="rId22"/>
+      <p:bold r:id="rId23"/>
+      <p:italic r:id="rId24"/>
+      <p:boldItalic r:id="rId25"/>
     </p:embeddedFont>
   </p:embeddedFontLst>
   <p:defaultTextStyle>
@@ -12169,6 +12170,498 @@
 </file>
 
 <file path=ppt/slides/slide10.xml><?xml version="1.0" encoding="utf-8"?>
+<p:sld xmlns:a="http://schemas.openxmlformats.org/drawingml/2006/main" xmlns:r="http://schemas.openxmlformats.org/officeDocument/2006/relationships" xmlns:p="http://schemas.openxmlformats.org/presentationml/2006/main">
+  <p:cSld>
+    <p:spTree>
+      <p:nvGrpSpPr>
+        <p:cNvPr id="1" name="Shape 512"/>
+        <p:cNvGrpSpPr/>
+        <p:nvPr/>
+      </p:nvGrpSpPr>
+      <p:grpSpPr>
+        <a:xfrm>
+          <a:off x="0" y="0"/>
+          <a:ext cx="0" cy="0"/>
+          <a:chOff x="0" y="0"/>
+          <a:chExt cx="0" cy="0"/>
+        </a:xfrm>
+      </p:grpSpPr>
+      <p:sp>
+        <p:nvSpPr>
+          <p:cNvPr id="513" name="Google Shape;513;p63"/>
+          <p:cNvSpPr/>
+          <p:nvPr/>
+        </p:nvSpPr>
+        <p:spPr>
+          <a:xfrm rot="-5400000" flipH="1">
+            <a:off x="1574473" y="2918261"/>
+            <a:ext cx="1476219" cy="2259418"/>
+          </a:xfrm>
+          <a:prstGeom prst="snip1Rect">
+            <a:avLst>
+              <a:gd name="adj" fmla="val 16667"/>
+            </a:avLst>
+          </a:prstGeom>
+          <a:solidFill>
+            <a:srgbClr val="434343"/>
+          </a:solidFill>
+          <a:ln>
+            <a:noFill/>
+          </a:ln>
+        </p:spPr>
+        <p:txBody>
+          <a:bodyPr spcFirstLastPara="1" wrap="square" lIns="91425" tIns="91425" rIns="91425" bIns="91425" anchor="ctr" anchorCtr="0">
+            <a:noAutofit/>
+          </a:bodyPr>
+          <a:lstStyle/>
+          <a:p>
+            <a:pPr marL="0" lvl="0" indent="0" algn="l" rtl="0">
+              <a:spcBef>
+                <a:spcPts val="0"/>
+              </a:spcBef>
+              <a:spcAft>
+                <a:spcPts val="0"/>
+              </a:spcAft>
+              <a:buNone/>
+            </a:pPr>
+            <a:endParaRPr/>
+          </a:p>
+        </p:txBody>
+      </p:sp>
+      <p:cxnSp>
+        <p:nvCxnSpPr>
+          <p:cNvPr id="514" name="Google Shape;514;p63"/>
+          <p:cNvCxnSpPr/>
+          <p:nvPr/>
+        </p:nvCxnSpPr>
+        <p:spPr>
+          <a:xfrm rot="10800000">
+            <a:off x="6682358" y="2949500"/>
+            <a:ext cx="2589600" cy="0"/>
+          </a:xfrm>
+          <a:prstGeom prst="straightConnector1">
+            <a:avLst/>
+          </a:prstGeom>
+          <a:noFill/>
+          <a:ln w="9525" cap="flat" cmpd="sng">
+            <a:solidFill>
+              <a:srgbClr val="434343"/>
+            </a:solidFill>
+            <a:prstDash val="solid"/>
+            <a:round/>
+            <a:headEnd type="none" w="med" len="med"/>
+            <a:tailEnd type="none" w="med" len="med"/>
+          </a:ln>
+        </p:spPr>
+      </p:cxnSp>
+      <p:cxnSp>
+        <p:nvCxnSpPr>
+          <p:cNvPr id="516" name="Google Shape;516;p63"/>
+          <p:cNvCxnSpPr/>
+          <p:nvPr/>
+        </p:nvCxnSpPr>
+        <p:spPr>
+          <a:xfrm rot="10800000">
+            <a:off x="-21400" y="2148175"/>
+            <a:ext cx="2441100" cy="0"/>
+          </a:xfrm>
+          <a:prstGeom prst="straightConnector1">
+            <a:avLst/>
+          </a:prstGeom>
+          <a:noFill/>
+          <a:ln w="9525" cap="flat" cmpd="sng">
+            <a:solidFill>
+              <a:srgbClr val="434343"/>
+            </a:solidFill>
+            <a:prstDash val="solid"/>
+            <a:round/>
+            <a:headEnd type="none" w="med" len="med"/>
+            <a:tailEnd type="none" w="med" len="med"/>
+          </a:ln>
+        </p:spPr>
+      </p:cxnSp>
+      <p:sp>
+        <p:nvSpPr>
+          <p:cNvPr id="518" name="Google Shape;518;p63"/>
+          <p:cNvSpPr txBox="1">
+            <a:spLocks noGrp="1"/>
+          </p:cNvSpPr>
+          <p:nvPr>
+            <p:ph type="ctrTitle" idx="2"/>
+          </p:nvPr>
+        </p:nvSpPr>
+        <p:spPr>
+          <a:xfrm>
+            <a:off x="1558889" y="3836182"/>
+            <a:ext cx="1507385" cy="423575"/>
+          </a:xfrm>
+          <a:prstGeom prst="rect">
+            <a:avLst/>
+          </a:prstGeom>
+        </p:spPr>
+        <p:txBody>
+          <a:bodyPr spcFirstLastPara="1" wrap="square" lIns="91425" tIns="91425" rIns="91425" bIns="91425" anchor="b" anchorCtr="0">
+            <a:noAutofit/>
+          </a:bodyPr>
+          <a:lstStyle/>
+          <a:p>
+            <a:pPr marL="0" lvl="0" indent="0" algn="l" rtl="0">
+              <a:spcBef>
+                <a:spcPts val="0"/>
+              </a:spcBef>
+              <a:spcAft>
+                <a:spcPts val="0"/>
+              </a:spcAft>
+              <a:buNone/>
+            </a:pPr>
+            <a:r>
+              <a:rPr lang="bg-BG" sz="1800" dirty="0">
+                <a:solidFill>
+                  <a:schemeClr val="lt1"/>
+                </a:solidFill>
+              </a:rPr>
+              <a:t>Изпращане на новини</a:t>
+            </a:r>
+            <a:endParaRPr dirty="0"/>
+          </a:p>
+        </p:txBody>
+      </p:sp>
+      <p:sp>
+        <p:nvSpPr>
+          <p:cNvPr id="13" name="Google Shape;513;p63"/>
+          <p:cNvSpPr/>
+          <p:nvPr/>
+        </p:nvSpPr>
+        <p:spPr>
+          <a:xfrm rot="-5400000" flipH="1">
+            <a:off x="3833891" y="1442041"/>
+            <a:ext cx="1476219" cy="2259418"/>
+          </a:xfrm>
+          <a:prstGeom prst="snip1Rect">
+            <a:avLst>
+              <a:gd name="adj" fmla="val 16667"/>
+            </a:avLst>
+          </a:prstGeom>
+          <a:solidFill>
+            <a:srgbClr val="434343"/>
+          </a:solidFill>
+          <a:ln>
+            <a:noFill/>
+          </a:ln>
+        </p:spPr>
+        <p:txBody>
+          <a:bodyPr spcFirstLastPara="1" wrap="square" lIns="91425" tIns="91425" rIns="91425" bIns="91425" anchor="ctr" anchorCtr="0">
+            <a:noAutofit/>
+          </a:bodyPr>
+          <a:lstStyle/>
+          <a:p>
+            <a:pPr marL="0" lvl="0" indent="0" algn="l" rtl="0">
+              <a:spcBef>
+                <a:spcPts val="0"/>
+              </a:spcBef>
+              <a:spcAft>
+                <a:spcPts val="0"/>
+              </a:spcAft>
+              <a:buNone/>
+            </a:pPr>
+            <a:endParaRPr/>
+          </a:p>
+        </p:txBody>
+      </p:sp>
+      <p:sp>
+        <p:nvSpPr>
+          <p:cNvPr id="14" name="Google Shape;518;p63"/>
+          <p:cNvSpPr txBox="1">
+            <a:spLocks noGrp="1"/>
+          </p:cNvSpPr>
+          <p:nvPr>
+            <p:ph type="ctrTitle" idx="2"/>
+          </p:nvPr>
+        </p:nvSpPr>
+        <p:spPr>
+          <a:xfrm>
+            <a:off x="3875667" y="2359962"/>
+            <a:ext cx="1392665" cy="423575"/>
+          </a:xfrm>
+          <a:prstGeom prst="rect">
+            <a:avLst/>
+          </a:prstGeom>
+        </p:spPr>
+        <p:txBody>
+          <a:bodyPr spcFirstLastPara="1" wrap="square" lIns="91425" tIns="91425" rIns="91425" bIns="91425" anchor="b" anchorCtr="0">
+            <a:noAutofit/>
+          </a:bodyPr>
+          <a:lstStyle/>
+          <a:p>
+            <a:pPr marL="0" lvl="0" indent="0" algn="l" rtl="0">
+              <a:spcBef>
+                <a:spcPts val="0"/>
+              </a:spcBef>
+              <a:spcAft>
+                <a:spcPts val="0"/>
+              </a:spcAft>
+              <a:buNone/>
+            </a:pPr>
+            <a:r>
+              <a:rPr lang="bg-BG" sz="1800" dirty="0">
+                <a:solidFill>
+                  <a:schemeClr val="lt1"/>
+                </a:solidFill>
+              </a:rPr>
+              <a:t>Машинно обучение</a:t>
+            </a:r>
+            <a:endParaRPr dirty="0"/>
+          </a:p>
+        </p:txBody>
+      </p:sp>
+      <p:sp>
+        <p:nvSpPr>
+          <p:cNvPr id="15" name="Google Shape;513;p63"/>
+          <p:cNvSpPr/>
+          <p:nvPr/>
+        </p:nvSpPr>
+        <p:spPr>
+          <a:xfrm rot="-5400000" flipH="1">
+            <a:off x="6093310" y="-34179"/>
+            <a:ext cx="1476219" cy="2259418"/>
+          </a:xfrm>
+          <a:prstGeom prst="snip1Rect">
+            <a:avLst>
+              <a:gd name="adj" fmla="val 16667"/>
+            </a:avLst>
+          </a:prstGeom>
+          <a:solidFill>
+            <a:srgbClr val="434343"/>
+          </a:solidFill>
+          <a:ln>
+            <a:noFill/>
+          </a:ln>
+        </p:spPr>
+        <p:txBody>
+          <a:bodyPr spcFirstLastPara="1" wrap="square" lIns="91425" tIns="91425" rIns="91425" bIns="91425" anchor="ctr" anchorCtr="0">
+            <a:noAutofit/>
+          </a:bodyPr>
+          <a:lstStyle/>
+          <a:p>
+            <a:pPr marL="0" lvl="0" indent="0" algn="l" rtl="0">
+              <a:spcBef>
+                <a:spcPts val="0"/>
+              </a:spcBef>
+              <a:spcAft>
+                <a:spcPts val="0"/>
+              </a:spcAft>
+              <a:buNone/>
+            </a:pPr>
+            <a:endParaRPr/>
+          </a:p>
+        </p:txBody>
+      </p:sp>
+      <p:sp>
+        <p:nvSpPr>
+          <p:cNvPr id="520" name="Google Shape;520;p63"/>
+          <p:cNvSpPr txBox="1">
+            <a:spLocks noGrp="1"/>
+          </p:cNvSpPr>
+          <p:nvPr>
+            <p:ph type="ctrTitle" idx="3"/>
+          </p:nvPr>
+        </p:nvSpPr>
+        <p:spPr>
+          <a:xfrm>
+            <a:off x="6084798" y="1095530"/>
+            <a:ext cx="1493241" cy="427500"/>
+          </a:xfrm>
+          <a:prstGeom prst="rect">
+            <a:avLst/>
+          </a:prstGeom>
+        </p:spPr>
+        <p:txBody>
+          <a:bodyPr spcFirstLastPara="1" wrap="square" lIns="91425" tIns="91425" rIns="91425" bIns="91425" anchor="b" anchorCtr="0">
+            <a:noAutofit/>
+          </a:bodyPr>
+          <a:lstStyle/>
+          <a:p>
+            <a:pPr marL="0" lvl="0" indent="0" algn="r" rtl="0">
+              <a:spcBef>
+                <a:spcPts val="0"/>
+              </a:spcBef>
+              <a:spcAft>
+                <a:spcPts val="0"/>
+              </a:spcAft>
+              <a:buNone/>
+            </a:pPr>
+            <a:r>
+              <a:rPr lang="bg-BG" sz="1800" dirty="0">
+                <a:solidFill>
+                  <a:schemeClr val="lt1"/>
+                </a:solidFill>
+              </a:rPr>
+              <a:t>Качване на файлове от албуми</a:t>
+            </a:r>
+            <a:endParaRPr lang="bg-BG" dirty="0"/>
+          </a:p>
+        </p:txBody>
+      </p:sp>
+    </p:spTree>
+  </p:cSld>
+  <p:clrMapOvr>
+    <a:masterClrMapping/>
+  </p:clrMapOvr>
+  <p:timing>
+    <p:tnLst>
+      <p:par>
+        <p:cTn id="1" dur="indefinite" restart="never" nodeType="tmRoot">
+          <p:childTnLst>
+            <p:seq concurrent="1" nextAc="seek">
+              <p:cTn id="2" dur="indefinite" nodeType="mainSeq">
+                <p:childTnLst>
+                  <p:par>
+                    <p:cTn id="3" fill="hold">
+                      <p:stCondLst>
+                        <p:cond delay="indefinite"/>
+                        <p:cond evt="onBegin" delay="0">
+                          <p:tn val="2"/>
+                        </p:cond>
+                      </p:stCondLst>
+                      <p:childTnLst>
+                        <p:par>
+                          <p:cTn id="4" fill="hold">
+                            <p:stCondLst>
+                              <p:cond delay="0"/>
+                            </p:stCondLst>
+                            <p:childTnLst>
+                              <p:par>
+                                <p:cTn id="5" presetID="2" presetClass="entr" presetSubtype="2" fill="hold" nodeType="afterEffect">
+                                  <p:stCondLst>
+                                    <p:cond delay="0"/>
+                                  </p:stCondLst>
+                                  <p:childTnLst>
+                                    <p:set>
+                                      <p:cBhvr>
+                                        <p:cTn id="6" dur="1" fill="hold">
+                                          <p:stCondLst>
+                                            <p:cond delay="0"/>
+                                          </p:stCondLst>
+                                        </p:cTn>
+                                        <p:tgtEl>
+                                          <p:spTgt spid="514"/>
+                                        </p:tgtEl>
+                                        <p:attrNameLst>
+                                          <p:attrName>style.visibility</p:attrName>
+                                        </p:attrNameLst>
+                                      </p:cBhvr>
+                                      <p:to>
+                                        <p:strVal val="visible"/>
+                                      </p:to>
+                                    </p:set>
+                                    <p:anim calcmode="lin" valueType="num">
+                                      <p:cBhvr additive="base">
+                                        <p:cTn id="7" dur="1000"/>
+                                        <p:tgtEl>
+                                          <p:spTgt spid="514"/>
+                                        </p:tgtEl>
+                                        <p:attrNameLst>
+                                          <p:attrName>ppt_x</p:attrName>
+                                        </p:attrNameLst>
+                                      </p:cBhvr>
+                                      <p:tavLst>
+                                        <p:tav tm="0">
+                                          <p:val>
+                                            <p:strVal val="#ppt_x+1"/>
+                                          </p:val>
+                                        </p:tav>
+                                        <p:tav tm="100000">
+                                          <p:val>
+                                            <p:strVal val="#ppt_x"/>
+                                          </p:val>
+                                        </p:tav>
+                                      </p:tavLst>
+                                    </p:anim>
+                                  </p:childTnLst>
+                                </p:cTn>
+                              </p:par>
+                              <p:par>
+                                <p:cTn id="8" presetID="2" presetClass="entr" presetSubtype="8" fill="hold" nodeType="withEffect">
+                                  <p:stCondLst>
+                                    <p:cond delay="0"/>
+                                  </p:stCondLst>
+                                  <p:childTnLst>
+                                    <p:set>
+                                      <p:cBhvr>
+                                        <p:cTn id="9" dur="1" fill="hold">
+                                          <p:stCondLst>
+                                            <p:cond delay="0"/>
+                                          </p:stCondLst>
+                                        </p:cTn>
+                                        <p:tgtEl>
+                                          <p:spTgt spid="516"/>
+                                        </p:tgtEl>
+                                        <p:attrNameLst>
+                                          <p:attrName>style.visibility</p:attrName>
+                                        </p:attrNameLst>
+                                      </p:cBhvr>
+                                      <p:to>
+                                        <p:strVal val="visible"/>
+                                      </p:to>
+                                    </p:set>
+                                    <p:anim calcmode="lin" valueType="num">
+                                      <p:cBhvr additive="base">
+                                        <p:cTn id="10" dur="1100"/>
+                                        <p:tgtEl>
+                                          <p:spTgt spid="516"/>
+                                        </p:tgtEl>
+                                        <p:attrNameLst>
+                                          <p:attrName>ppt_x</p:attrName>
+                                        </p:attrNameLst>
+                                      </p:cBhvr>
+                                      <p:tavLst>
+                                        <p:tav tm="0">
+                                          <p:val>
+                                            <p:strVal val="#ppt_x-1"/>
+                                          </p:val>
+                                        </p:tav>
+                                        <p:tav tm="100000">
+                                          <p:val>
+                                            <p:strVal val="#ppt_x"/>
+                                          </p:val>
+                                        </p:tav>
+                                      </p:tavLst>
+                                    </p:anim>
+                                  </p:childTnLst>
+                                </p:cTn>
+                              </p:par>
+                            </p:childTnLst>
+                          </p:cTn>
+                        </p:par>
+                      </p:childTnLst>
+                    </p:cTn>
+                  </p:par>
+                </p:childTnLst>
+              </p:cTn>
+              <p:prevCondLst>
+                <p:cond evt="onPrev" delay="0">
+                  <p:tgtEl>
+                    <p:sldTgt/>
+                  </p:tgtEl>
+                </p:cond>
+              </p:prevCondLst>
+              <p:nextCondLst>
+                <p:cond evt="onNext" delay="0">
+                  <p:tgtEl>
+                    <p:sldTgt/>
+                  </p:tgtEl>
+                </p:cond>
+              </p:nextCondLst>
+            </p:seq>
+          </p:childTnLst>
+        </p:cTn>
+      </p:par>
+    </p:tnLst>
+  </p:timing>
+</p:sld>
+</file>
+
+<file path=ppt/slides/slide11.xml><?xml version="1.0" encoding="utf-8"?>
 <p:sld xmlns:a="http://schemas.openxmlformats.org/drawingml/2006/main" xmlns:r="http://schemas.openxmlformats.org/officeDocument/2006/relationships" xmlns:p="http://schemas.openxmlformats.org/presentationml/2006/main">
   <p:cSld>
     <p:spTree>
@@ -17931,6 +18424,66 @@
   <p:cSld>
     <p:spTree>
       <p:nvGrpSpPr>
+        <p:cNvPr id="1" name=""/>
+        <p:cNvGrpSpPr/>
+        <p:nvPr/>
+      </p:nvGrpSpPr>
+      <p:grpSpPr>
+        <a:xfrm>
+          <a:off x="0" y="0"/>
+          <a:ext cx="0" cy="0"/>
+          <a:chOff x="0" y="0"/>
+          <a:chExt cx="0" cy="0"/>
+        </a:xfrm>
+      </p:grpSpPr>
+      <p:pic>
+        <p:nvPicPr>
+          <p:cNvPr id="5" name="Картина 4">
+            <a:extLst>
+              <a:ext uri="{FF2B5EF4-FFF2-40B4-BE49-F238E27FC236}">
+                <a16:creationId xmlns:a16="http://schemas.microsoft.com/office/drawing/2014/main" id="{9A1C5844-43B3-4382-B877-48D8D7972389}"/>
+              </a:ext>
+            </a:extLst>
+          </p:cNvPr>
+          <p:cNvPicPr>
+            <a:picLocks noChangeAspect="1"/>
+          </p:cNvPicPr>
+          <p:nvPr/>
+        </p:nvPicPr>
+        <p:blipFill>
+          <a:blip r:embed="rId2"/>
+          <a:stretch>
+            <a:fillRect/>
+          </a:stretch>
+        </p:blipFill>
+        <p:spPr>
+          <a:xfrm>
+            <a:off x="2730597" y="0"/>
+            <a:ext cx="3570180" cy="5143500"/>
+          </a:xfrm>
+          <a:prstGeom prst="rect">
+            <a:avLst/>
+          </a:prstGeom>
+        </p:spPr>
+      </p:pic>
+    </p:spTree>
+    <p:extLst>
+      <p:ext uri="{BB962C8B-B14F-4D97-AF65-F5344CB8AC3E}">
+        <p14:creationId xmlns:p14="http://schemas.microsoft.com/office/powerpoint/2010/main" val="1254250532"/>
+      </p:ext>
+    </p:extLst>
+  </p:cSld>
+  <p:clrMapOvr>
+    <a:masterClrMapping/>
+  </p:clrMapOvr>
+</p:sld>
+</file>
+
+<file path=ppt/slides/slide9.xml><?xml version="1.0" encoding="utf-8"?>
+<p:sld xmlns:a="http://schemas.openxmlformats.org/drawingml/2006/main" xmlns:r="http://schemas.openxmlformats.org/officeDocument/2006/relationships" xmlns:p="http://schemas.openxmlformats.org/presentationml/2006/main">
+  <p:cSld>
+    <p:spTree>
+      <p:nvGrpSpPr>
         <p:cNvPr id="1" name="Shape 626"/>
         <p:cNvGrpSpPr/>
         <p:nvPr/>
@@ -18768,498 +19321,6 @@
 </p:sld>
 </file>
 
-<file path=ppt/slides/slide9.xml><?xml version="1.0" encoding="utf-8"?>
-<p:sld xmlns:a="http://schemas.openxmlformats.org/drawingml/2006/main" xmlns:r="http://schemas.openxmlformats.org/officeDocument/2006/relationships" xmlns:p="http://schemas.openxmlformats.org/presentationml/2006/main">
-  <p:cSld>
-    <p:spTree>
-      <p:nvGrpSpPr>
-        <p:cNvPr id="1" name="Shape 512"/>
-        <p:cNvGrpSpPr/>
-        <p:nvPr/>
-      </p:nvGrpSpPr>
-      <p:grpSpPr>
-        <a:xfrm>
-          <a:off x="0" y="0"/>
-          <a:ext cx="0" cy="0"/>
-          <a:chOff x="0" y="0"/>
-          <a:chExt cx="0" cy="0"/>
-        </a:xfrm>
-      </p:grpSpPr>
-      <p:sp>
-        <p:nvSpPr>
-          <p:cNvPr id="513" name="Google Shape;513;p63"/>
-          <p:cNvSpPr/>
-          <p:nvPr/>
-        </p:nvSpPr>
-        <p:spPr>
-          <a:xfrm rot="-5400000" flipH="1">
-            <a:off x="1574473" y="2918261"/>
-            <a:ext cx="1476219" cy="2259418"/>
-          </a:xfrm>
-          <a:prstGeom prst="snip1Rect">
-            <a:avLst>
-              <a:gd name="adj" fmla="val 16667"/>
-            </a:avLst>
-          </a:prstGeom>
-          <a:solidFill>
-            <a:srgbClr val="434343"/>
-          </a:solidFill>
-          <a:ln>
-            <a:noFill/>
-          </a:ln>
-        </p:spPr>
-        <p:txBody>
-          <a:bodyPr spcFirstLastPara="1" wrap="square" lIns="91425" tIns="91425" rIns="91425" bIns="91425" anchor="ctr" anchorCtr="0">
-            <a:noAutofit/>
-          </a:bodyPr>
-          <a:lstStyle/>
-          <a:p>
-            <a:pPr marL="0" lvl="0" indent="0" algn="l" rtl="0">
-              <a:spcBef>
-                <a:spcPts val="0"/>
-              </a:spcBef>
-              <a:spcAft>
-                <a:spcPts val="0"/>
-              </a:spcAft>
-              <a:buNone/>
-            </a:pPr>
-            <a:endParaRPr/>
-          </a:p>
-        </p:txBody>
-      </p:sp>
-      <p:cxnSp>
-        <p:nvCxnSpPr>
-          <p:cNvPr id="514" name="Google Shape;514;p63"/>
-          <p:cNvCxnSpPr/>
-          <p:nvPr/>
-        </p:nvCxnSpPr>
-        <p:spPr>
-          <a:xfrm rot="10800000">
-            <a:off x="6682358" y="2949500"/>
-            <a:ext cx="2589600" cy="0"/>
-          </a:xfrm>
-          <a:prstGeom prst="straightConnector1">
-            <a:avLst/>
-          </a:prstGeom>
-          <a:noFill/>
-          <a:ln w="9525" cap="flat" cmpd="sng">
-            <a:solidFill>
-              <a:srgbClr val="434343"/>
-            </a:solidFill>
-            <a:prstDash val="solid"/>
-            <a:round/>
-            <a:headEnd type="none" w="med" len="med"/>
-            <a:tailEnd type="none" w="med" len="med"/>
-          </a:ln>
-        </p:spPr>
-      </p:cxnSp>
-      <p:cxnSp>
-        <p:nvCxnSpPr>
-          <p:cNvPr id="516" name="Google Shape;516;p63"/>
-          <p:cNvCxnSpPr/>
-          <p:nvPr/>
-        </p:nvCxnSpPr>
-        <p:spPr>
-          <a:xfrm rot="10800000">
-            <a:off x="-21400" y="2148175"/>
-            <a:ext cx="2441100" cy="0"/>
-          </a:xfrm>
-          <a:prstGeom prst="straightConnector1">
-            <a:avLst/>
-          </a:prstGeom>
-          <a:noFill/>
-          <a:ln w="9525" cap="flat" cmpd="sng">
-            <a:solidFill>
-              <a:srgbClr val="434343"/>
-            </a:solidFill>
-            <a:prstDash val="solid"/>
-            <a:round/>
-            <a:headEnd type="none" w="med" len="med"/>
-            <a:tailEnd type="none" w="med" len="med"/>
-          </a:ln>
-        </p:spPr>
-      </p:cxnSp>
-      <p:sp>
-        <p:nvSpPr>
-          <p:cNvPr id="518" name="Google Shape;518;p63"/>
-          <p:cNvSpPr txBox="1">
-            <a:spLocks noGrp="1"/>
-          </p:cNvSpPr>
-          <p:nvPr>
-            <p:ph type="ctrTitle" idx="2"/>
-          </p:nvPr>
-        </p:nvSpPr>
-        <p:spPr>
-          <a:xfrm>
-            <a:off x="1558889" y="3836182"/>
-            <a:ext cx="1507385" cy="423575"/>
-          </a:xfrm>
-          <a:prstGeom prst="rect">
-            <a:avLst/>
-          </a:prstGeom>
-        </p:spPr>
-        <p:txBody>
-          <a:bodyPr spcFirstLastPara="1" wrap="square" lIns="91425" tIns="91425" rIns="91425" bIns="91425" anchor="b" anchorCtr="0">
-            <a:noAutofit/>
-          </a:bodyPr>
-          <a:lstStyle/>
-          <a:p>
-            <a:pPr marL="0" lvl="0" indent="0" algn="l" rtl="0">
-              <a:spcBef>
-                <a:spcPts val="0"/>
-              </a:spcBef>
-              <a:spcAft>
-                <a:spcPts val="0"/>
-              </a:spcAft>
-              <a:buNone/>
-            </a:pPr>
-            <a:r>
-              <a:rPr lang="bg-BG" sz="1800" dirty="0">
-                <a:solidFill>
-                  <a:schemeClr val="lt1"/>
-                </a:solidFill>
-              </a:rPr>
-              <a:t>Изпращане на новини</a:t>
-            </a:r>
-            <a:endParaRPr dirty="0"/>
-          </a:p>
-        </p:txBody>
-      </p:sp>
-      <p:sp>
-        <p:nvSpPr>
-          <p:cNvPr id="13" name="Google Shape;513;p63"/>
-          <p:cNvSpPr/>
-          <p:nvPr/>
-        </p:nvSpPr>
-        <p:spPr>
-          <a:xfrm rot="-5400000" flipH="1">
-            <a:off x="3833891" y="1442041"/>
-            <a:ext cx="1476219" cy="2259418"/>
-          </a:xfrm>
-          <a:prstGeom prst="snip1Rect">
-            <a:avLst>
-              <a:gd name="adj" fmla="val 16667"/>
-            </a:avLst>
-          </a:prstGeom>
-          <a:solidFill>
-            <a:srgbClr val="434343"/>
-          </a:solidFill>
-          <a:ln>
-            <a:noFill/>
-          </a:ln>
-        </p:spPr>
-        <p:txBody>
-          <a:bodyPr spcFirstLastPara="1" wrap="square" lIns="91425" tIns="91425" rIns="91425" bIns="91425" anchor="ctr" anchorCtr="0">
-            <a:noAutofit/>
-          </a:bodyPr>
-          <a:lstStyle/>
-          <a:p>
-            <a:pPr marL="0" lvl="0" indent="0" algn="l" rtl="0">
-              <a:spcBef>
-                <a:spcPts val="0"/>
-              </a:spcBef>
-              <a:spcAft>
-                <a:spcPts val="0"/>
-              </a:spcAft>
-              <a:buNone/>
-            </a:pPr>
-            <a:endParaRPr/>
-          </a:p>
-        </p:txBody>
-      </p:sp>
-      <p:sp>
-        <p:nvSpPr>
-          <p:cNvPr id="14" name="Google Shape;518;p63"/>
-          <p:cNvSpPr txBox="1">
-            <a:spLocks noGrp="1"/>
-          </p:cNvSpPr>
-          <p:nvPr>
-            <p:ph type="ctrTitle" idx="2"/>
-          </p:nvPr>
-        </p:nvSpPr>
-        <p:spPr>
-          <a:xfrm>
-            <a:off x="3875667" y="2359962"/>
-            <a:ext cx="1392665" cy="423575"/>
-          </a:xfrm>
-          <a:prstGeom prst="rect">
-            <a:avLst/>
-          </a:prstGeom>
-        </p:spPr>
-        <p:txBody>
-          <a:bodyPr spcFirstLastPara="1" wrap="square" lIns="91425" tIns="91425" rIns="91425" bIns="91425" anchor="b" anchorCtr="0">
-            <a:noAutofit/>
-          </a:bodyPr>
-          <a:lstStyle/>
-          <a:p>
-            <a:pPr marL="0" lvl="0" indent="0" algn="l" rtl="0">
-              <a:spcBef>
-                <a:spcPts val="0"/>
-              </a:spcBef>
-              <a:spcAft>
-                <a:spcPts val="0"/>
-              </a:spcAft>
-              <a:buNone/>
-            </a:pPr>
-            <a:r>
-              <a:rPr lang="bg-BG" sz="1800" dirty="0">
-                <a:solidFill>
-                  <a:schemeClr val="lt1"/>
-                </a:solidFill>
-              </a:rPr>
-              <a:t>Машинно обучение</a:t>
-            </a:r>
-            <a:endParaRPr dirty="0"/>
-          </a:p>
-        </p:txBody>
-      </p:sp>
-      <p:sp>
-        <p:nvSpPr>
-          <p:cNvPr id="15" name="Google Shape;513;p63"/>
-          <p:cNvSpPr/>
-          <p:nvPr/>
-        </p:nvSpPr>
-        <p:spPr>
-          <a:xfrm rot="-5400000" flipH="1">
-            <a:off x="6093310" y="-34179"/>
-            <a:ext cx="1476219" cy="2259418"/>
-          </a:xfrm>
-          <a:prstGeom prst="snip1Rect">
-            <a:avLst>
-              <a:gd name="adj" fmla="val 16667"/>
-            </a:avLst>
-          </a:prstGeom>
-          <a:solidFill>
-            <a:srgbClr val="434343"/>
-          </a:solidFill>
-          <a:ln>
-            <a:noFill/>
-          </a:ln>
-        </p:spPr>
-        <p:txBody>
-          <a:bodyPr spcFirstLastPara="1" wrap="square" lIns="91425" tIns="91425" rIns="91425" bIns="91425" anchor="ctr" anchorCtr="0">
-            <a:noAutofit/>
-          </a:bodyPr>
-          <a:lstStyle/>
-          <a:p>
-            <a:pPr marL="0" lvl="0" indent="0" algn="l" rtl="0">
-              <a:spcBef>
-                <a:spcPts val="0"/>
-              </a:spcBef>
-              <a:spcAft>
-                <a:spcPts val="0"/>
-              </a:spcAft>
-              <a:buNone/>
-            </a:pPr>
-            <a:endParaRPr/>
-          </a:p>
-        </p:txBody>
-      </p:sp>
-      <p:sp>
-        <p:nvSpPr>
-          <p:cNvPr id="520" name="Google Shape;520;p63"/>
-          <p:cNvSpPr txBox="1">
-            <a:spLocks noGrp="1"/>
-          </p:cNvSpPr>
-          <p:nvPr>
-            <p:ph type="ctrTitle" idx="3"/>
-          </p:nvPr>
-        </p:nvSpPr>
-        <p:spPr>
-          <a:xfrm>
-            <a:off x="6084798" y="1095530"/>
-            <a:ext cx="1493241" cy="427500"/>
-          </a:xfrm>
-          <a:prstGeom prst="rect">
-            <a:avLst/>
-          </a:prstGeom>
-        </p:spPr>
-        <p:txBody>
-          <a:bodyPr spcFirstLastPara="1" wrap="square" lIns="91425" tIns="91425" rIns="91425" bIns="91425" anchor="b" anchorCtr="0">
-            <a:noAutofit/>
-          </a:bodyPr>
-          <a:lstStyle/>
-          <a:p>
-            <a:pPr marL="0" lvl="0" indent="0" algn="r" rtl="0">
-              <a:spcBef>
-                <a:spcPts val="0"/>
-              </a:spcBef>
-              <a:spcAft>
-                <a:spcPts val="0"/>
-              </a:spcAft>
-              <a:buNone/>
-            </a:pPr>
-            <a:r>
-              <a:rPr lang="bg-BG" sz="1800" dirty="0">
-                <a:solidFill>
-                  <a:schemeClr val="lt1"/>
-                </a:solidFill>
-              </a:rPr>
-              <a:t>Качване на файлове от албуми</a:t>
-            </a:r>
-            <a:endParaRPr lang="bg-BG" dirty="0"/>
-          </a:p>
-        </p:txBody>
-      </p:sp>
-    </p:spTree>
-  </p:cSld>
-  <p:clrMapOvr>
-    <a:masterClrMapping/>
-  </p:clrMapOvr>
-  <p:timing>
-    <p:tnLst>
-      <p:par>
-        <p:cTn id="1" dur="indefinite" restart="never" nodeType="tmRoot">
-          <p:childTnLst>
-            <p:seq concurrent="1" nextAc="seek">
-              <p:cTn id="2" dur="indefinite" nodeType="mainSeq">
-                <p:childTnLst>
-                  <p:par>
-                    <p:cTn id="3" fill="hold">
-                      <p:stCondLst>
-                        <p:cond delay="indefinite"/>
-                        <p:cond evt="onBegin" delay="0">
-                          <p:tn val="2"/>
-                        </p:cond>
-                      </p:stCondLst>
-                      <p:childTnLst>
-                        <p:par>
-                          <p:cTn id="4" fill="hold">
-                            <p:stCondLst>
-                              <p:cond delay="0"/>
-                            </p:stCondLst>
-                            <p:childTnLst>
-                              <p:par>
-                                <p:cTn id="5" presetID="2" presetClass="entr" presetSubtype="2" fill="hold" nodeType="afterEffect">
-                                  <p:stCondLst>
-                                    <p:cond delay="0"/>
-                                  </p:stCondLst>
-                                  <p:childTnLst>
-                                    <p:set>
-                                      <p:cBhvr>
-                                        <p:cTn id="6" dur="1" fill="hold">
-                                          <p:stCondLst>
-                                            <p:cond delay="0"/>
-                                          </p:stCondLst>
-                                        </p:cTn>
-                                        <p:tgtEl>
-                                          <p:spTgt spid="514"/>
-                                        </p:tgtEl>
-                                        <p:attrNameLst>
-                                          <p:attrName>style.visibility</p:attrName>
-                                        </p:attrNameLst>
-                                      </p:cBhvr>
-                                      <p:to>
-                                        <p:strVal val="visible"/>
-                                      </p:to>
-                                    </p:set>
-                                    <p:anim calcmode="lin" valueType="num">
-                                      <p:cBhvr additive="base">
-                                        <p:cTn id="7" dur="1000"/>
-                                        <p:tgtEl>
-                                          <p:spTgt spid="514"/>
-                                        </p:tgtEl>
-                                        <p:attrNameLst>
-                                          <p:attrName>ppt_x</p:attrName>
-                                        </p:attrNameLst>
-                                      </p:cBhvr>
-                                      <p:tavLst>
-                                        <p:tav tm="0">
-                                          <p:val>
-                                            <p:strVal val="#ppt_x+1"/>
-                                          </p:val>
-                                        </p:tav>
-                                        <p:tav tm="100000">
-                                          <p:val>
-                                            <p:strVal val="#ppt_x"/>
-                                          </p:val>
-                                        </p:tav>
-                                      </p:tavLst>
-                                    </p:anim>
-                                  </p:childTnLst>
-                                </p:cTn>
-                              </p:par>
-                              <p:par>
-                                <p:cTn id="8" presetID="2" presetClass="entr" presetSubtype="8" fill="hold" nodeType="withEffect">
-                                  <p:stCondLst>
-                                    <p:cond delay="0"/>
-                                  </p:stCondLst>
-                                  <p:childTnLst>
-                                    <p:set>
-                                      <p:cBhvr>
-                                        <p:cTn id="9" dur="1" fill="hold">
-                                          <p:stCondLst>
-                                            <p:cond delay="0"/>
-                                          </p:stCondLst>
-                                        </p:cTn>
-                                        <p:tgtEl>
-                                          <p:spTgt spid="516"/>
-                                        </p:tgtEl>
-                                        <p:attrNameLst>
-                                          <p:attrName>style.visibility</p:attrName>
-                                        </p:attrNameLst>
-                                      </p:cBhvr>
-                                      <p:to>
-                                        <p:strVal val="visible"/>
-                                      </p:to>
-                                    </p:set>
-                                    <p:anim calcmode="lin" valueType="num">
-                                      <p:cBhvr additive="base">
-                                        <p:cTn id="10" dur="1100"/>
-                                        <p:tgtEl>
-                                          <p:spTgt spid="516"/>
-                                        </p:tgtEl>
-                                        <p:attrNameLst>
-                                          <p:attrName>ppt_x</p:attrName>
-                                        </p:attrNameLst>
-                                      </p:cBhvr>
-                                      <p:tavLst>
-                                        <p:tav tm="0">
-                                          <p:val>
-                                            <p:strVal val="#ppt_x-1"/>
-                                          </p:val>
-                                        </p:tav>
-                                        <p:tav tm="100000">
-                                          <p:val>
-                                            <p:strVal val="#ppt_x"/>
-                                          </p:val>
-                                        </p:tav>
-                                      </p:tavLst>
-                                    </p:anim>
-                                  </p:childTnLst>
-                                </p:cTn>
-                              </p:par>
-                            </p:childTnLst>
-                          </p:cTn>
-                        </p:par>
-                      </p:childTnLst>
-                    </p:cTn>
-                  </p:par>
-                </p:childTnLst>
-              </p:cTn>
-              <p:prevCondLst>
-                <p:cond evt="onPrev" delay="0">
-                  <p:tgtEl>
-                    <p:sldTgt/>
-                  </p:tgtEl>
-                </p:cond>
-              </p:prevCondLst>
-              <p:nextCondLst>
-                <p:cond evt="onNext" delay="0">
-                  <p:tgtEl>
-                    <p:sldTgt/>
-                  </p:tgtEl>
-                </p:cond>
-              </p:nextCondLst>
-            </p:seq>
-          </p:childTnLst>
-        </p:cTn>
-      </p:par>
-    </p:tnLst>
-  </p:timing>
-</p:sld>
-</file>
-
 <file path=ppt/theme/theme1.xml><?xml version="1.0" encoding="utf-8"?>
 <a:theme xmlns:a="http://schemas.openxmlformats.org/drawingml/2006/main" name="Tech Newsletter XL by Slidesgo">
   <a:themeElements>

</xml_diff>